<commit_message>
Replace EE559_Group7_Mini_Project_Poster.pptx to redo fixes done earlier.
</commit_message>
<xml_diff>
--- a/admin-docs/EE559_Group7_Mini_Project_Poster.pptx
+++ b/admin-docs/EE559_Group7_Mini_Project_Poster.pptx
@@ -5743,7 +5743,7 @@
               <a:buNone/>
             </a:pPr>
             <a:r>
-              <a:rPr lang="en-GB" sz="8000">
+              <a:rPr lang="en-GB" sz="8000" dirty="0">
                 <a:solidFill>
                   <a:srgbClr val="143264"/>
                 </a:solidFill>
@@ -5751,14 +5751,14 @@
               <a:t>Leveraging Translation-Based</a:t>
             </a:r>
             <a:br>
-              <a:rPr lang="en-GB" sz="8000">
+              <a:rPr lang="en-GB" sz="8000" dirty="0">
                 <a:solidFill>
                   <a:srgbClr val="143264"/>
                 </a:solidFill>
               </a:rPr>
             </a:br>
             <a:r>
-              <a:rPr lang="en-GB" sz="8000">
+              <a:rPr lang="en-GB" sz="8000" dirty="0">
                 <a:solidFill>
                   <a:srgbClr val="143264"/>
                 </a:solidFill>
@@ -5780,12 +5780,12 @@
               <a:buNone/>
             </a:pPr>
             <a:r>
-              <a:rPr lang="en-GB" sz="8000">
+              <a:rPr lang="en-GB" sz="8000" dirty="0">
                 <a:solidFill>
                   <a:srgbClr val="143264"/>
                 </a:solidFill>
               </a:rPr>
-              <a:t>Detection in Low Resource Languages</a:t>
+              <a:t>Detection in Low-Resource Languages</a:t>
             </a:r>
           </a:p>
         </p:txBody>
@@ -6813,7 +6813,7 @@
                   <a:schemeClr val="dk2"/>
                 </a:solidFill>
               </a:rPr>
-              <a:t>Hate speech detection in low –resource languages is limited by the scarcity of annotated data, which hinders the effectiveness of classifiers. This project aims to enhance hate speech detection in Arabic, a low-resource language, by leveraging translation-based transfer learning. The goal is to improve classification performance by fine-tuning pre-trained BERT-based models on a large English dataset and then finetuning them with English translations of an Arabic dataset. </a:t>
+              <a:t>Hate speech detection in low-resource languages is limited by the scarcity of annotated data, which hinders the effectiveness of classifiers. This project aims to enhance hate speech detection in Arabic, a low-resource language, by leveraging translation-based transfer learning. The goal is to improve classification performance by fine-tuning pre-trained BERT-based models on a large English dataset and then finetuning them with English translations of an Arabic dataset. </a:t>
             </a:r>
           </a:p>
         </p:txBody>
@@ -7204,7 +7204,7 @@
           <p:nvPr>
             <p:extLst>
               <p:ext uri="{D42A27DB-BD31-4B8C-83A1-F6EECF244321}">
-                <p14:modId xmlns:p14="http://schemas.microsoft.com/office/powerpoint/2010/main" val="3915492938"/>
+                <p14:modId xmlns:p14="http://schemas.microsoft.com/office/powerpoint/2010/main" val="3585965938"/>
               </p:ext>
             </p:extLst>
           </p:nvPr>
@@ -8028,6 +8028,10 @@
                         <a:defRPr/>
                       </a:pPr>
                       <a:r>
+                        <a:rPr lang="de-CH" sz="3700" dirty="0"/>
+                        <a:t> </a:t>
+                      </a:r>
+                      <a:r>
                         <a:rPr lang="de-CH" sz="3700" dirty="0" err="1"/>
                         <a:t>RoBERTa</a:t>
                       </a:r>
@@ -8153,7 +8157,7 @@
                       </a:pPr>
                       <a:r>
                         <a:rPr lang="de-CH" sz="3700" dirty="0"/>
-                        <a:t>0.6825</a:t>
+                        <a:t>0.6828</a:t>
                       </a:r>
                       <a:endParaRPr sz="3700" dirty="0"/>
                     </a:p>
@@ -8280,7 +8284,7 @@
           <p:nvPr>
             <p:extLst>
               <p:ext uri="{D42A27DB-BD31-4B8C-83A1-F6EECF244321}">
-                <p14:modId xmlns:p14="http://schemas.microsoft.com/office/powerpoint/2010/main" val="2447010439"/>
+                <p14:modId xmlns:p14="http://schemas.microsoft.com/office/powerpoint/2010/main" val="2042672163"/>
               </p:ext>
             </p:extLst>
           </p:nvPr>
@@ -9101,12 +9105,12 @@
                         <a:defRPr/>
                       </a:pPr>
                       <a:r>
-                        <a:rPr lang="de-CH" sz="3700" dirty="0" err="1"/>
-                        <a:t>RoBERTa</a:t>
+                        <a:rPr lang="de-CH" sz="3700" dirty="0"/>
+                        <a:t> </a:t>
                       </a:r>
                       <a:r>
-                        <a:rPr lang="de-CH" sz="3700" dirty="0"/>
-                        <a:t> CC</a:t>
+                        <a:rPr lang="de-CH" sz="3700" dirty="0" err="1"/>
+                        <a:t>BERTweet</a:t>
                       </a:r>
                       <a:endParaRPr sz="3700" dirty="0"/>
                     </a:p>
@@ -9165,7 +9169,7 @@
                         <a:buNone/>
                       </a:pPr>
                       <a:r>
-                        <a:rPr lang="en-GB" sz="3700" noProof="0"/>
+                        <a:rPr lang="en-GB" sz="3700" noProof="0" dirty="0"/>
                         <a:t>Arabic T</a:t>
                       </a:r>
                     </a:p>
@@ -9225,7 +9229,7 @@
                       </a:pPr>
                       <a:r>
                         <a:rPr lang="de-CH" sz="3700" dirty="0"/>
-                        <a:t>0.7135</a:t>
+                        <a:t>0.6989</a:t>
                       </a:r>
                       <a:endParaRPr sz="3700" dirty="0"/>
                     </a:p>
@@ -9285,7 +9289,7 @@
                       </a:pPr>
                       <a:r>
                         <a:rPr lang="de-CH" sz="3700" dirty="0"/>
-                        <a:t>0.0181</a:t>
+                        <a:t>0.0183</a:t>
                       </a:r>
                       <a:endParaRPr sz="3700" dirty="0"/>
                     </a:p>
@@ -9361,8 +9365,16 @@
                         <a:defRPr/>
                       </a:pPr>
                       <a:r>
+                        <a:rPr lang="de-CH" sz="3700" dirty="0"/>
+                        <a:t> </a:t>
+                      </a:r>
+                      <a:r>
                         <a:rPr lang="de-CH" sz="3700" dirty="0" err="1"/>
-                        <a:t>BERTweet</a:t>
+                        <a:t>RoBERTa</a:t>
+                      </a:r>
+                      <a:r>
+                        <a:rPr lang="de-CH" sz="3700" dirty="0"/>
+                        <a:t> CC</a:t>
                       </a:r>
                       <a:endParaRPr sz="3700" dirty="0"/>
                     </a:p>
@@ -9481,7 +9493,7 @@
                       </a:pPr>
                       <a:r>
                         <a:rPr lang="de-CH" sz="3700" dirty="0"/>
-                        <a:t>0.6989</a:t>
+                        <a:t>0.7135</a:t>
                       </a:r>
                       <a:endParaRPr sz="3700" dirty="0"/>
                     </a:p>
@@ -9541,7 +9553,7 @@
                       </a:pPr>
                       <a:r>
                         <a:rPr lang="de-CH" sz="3700" dirty="0"/>
-                        <a:t>0.0183</a:t>
+                        <a:t>0.0181</a:t>
                       </a:r>
                       <a:endParaRPr sz="3700" dirty="0"/>
                     </a:p>

</xml_diff>